<commit_message>
Update to food and powerpoint design
</commit_message>
<xml_diff>
--- a/ProjectInformation/Powerpoint designs/V1/powerpoint design.pptx
+++ b/ProjectInformation/Powerpoint designs/V1/powerpoint design.pptx
@@ -13,6 +13,7 @@
     <p:sldId id="261" r:id="rId7"/>
     <p:sldId id="262" r:id="rId8"/>
     <p:sldId id="263" r:id="rId9"/>
+    <p:sldId id="264" r:id="rId10"/>
   </p:sldIdLst>
   <p:sldSz cx="12192000" cy="6858000"/>
   <p:notesSz cx="6858000" cy="9144000"/>
@@ -268,7 +269,7 @@
           <a:p>
             <a:fld id="{B9C78DC0-302C-4AF6-A3B7-474A49631725}" type="datetimeFigureOut">
               <a:rPr lang="en-GB" smtClean="0"/>
-              <a:t>24/03/2023</a:t>
+              <a:t>17/04/2023</a:t>
             </a:fld>
             <a:endParaRPr lang="en-GB"/>
           </a:p>
@@ -468,7 +469,7 @@
           <a:p>
             <a:fld id="{B9C78DC0-302C-4AF6-A3B7-474A49631725}" type="datetimeFigureOut">
               <a:rPr lang="en-GB" smtClean="0"/>
-              <a:t>24/03/2023</a:t>
+              <a:t>17/04/2023</a:t>
             </a:fld>
             <a:endParaRPr lang="en-GB"/>
           </a:p>
@@ -678,7 +679,7 @@
           <a:p>
             <a:fld id="{B9C78DC0-302C-4AF6-A3B7-474A49631725}" type="datetimeFigureOut">
               <a:rPr lang="en-GB" smtClean="0"/>
-              <a:t>24/03/2023</a:t>
+              <a:t>17/04/2023</a:t>
             </a:fld>
             <a:endParaRPr lang="en-GB"/>
           </a:p>
@@ -878,7 +879,7 @@
           <a:p>
             <a:fld id="{B9C78DC0-302C-4AF6-A3B7-474A49631725}" type="datetimeFigureOut">
               <a:rPr lang="en-GB" smtClean="0"/>
-              <a:t>24/03/2023</a:t>
+              <a:t>17/04/2023</a:t>
             </a:fld>
             <a:endParaRPr lang="en-GB"/>
           </a:p>
@@ -1154,7 +1155,7 @@
           <a:p>
             <a:fld id="{B9C78DC0-302C-4AF6-A3B7-474A49631725}" type="datetimeFigureOut">
               <a:rPr lang="en-GB" smtClean="0"/>
-              <a:t>24/03/2023</a:t>
+              <a:t>17/04/2023</a:t>
             </a:fld>
             <a:endParaRPr lang="en-GB"/>
           </a:p>
@@ -1422,7 +1423,7 @@
           <a:p>
             <a:fld id="{B9C78DC0-302C-4AF6-A3B7-474A49631725}" type="datetimeFigureOut">
               <a:rPr lang="en-GB" smtClean="0"/>
-              <a:t>24/03/2023</a:t>
+              <a:t>17/04/2023</a:t>
             </a:fld>
             <a:endParaRPr lang="en-GB"/>
           </a:p>
@@ -1837,7 +1838,7 @@
           <a:p>
             <a:fld id="{B9C78DC0-302C-4AF6-A3B7-474A49631725}" type="datetimeFigureOut">
               <a:rPr lang="en-GB" smtClean="0"/>
-              <a:t>24/03/2023</a:t>
+              <a:t>17/04/2023</a:t>
             </a:fld>
             <a:endParaRPr lang="en-GB"/>
           </a:p>
@@ -1979,7 +1980,7 @@
           <a:p>
             <a:fld id="{B9C78DC0-302C-4AF6-A3B7-474A49631725}" type="datetimeFigureOut">
               <a:rPr lang="en-GB" smtClean="0"/>
-              <a:t>24/03/2023</a:t>
+              <a:t>17/04/2023</a:t>
             </a:fld>
             <a:endParaRPr lang="en-GB"/>
           </a:p>
@@ -2092,7 +2093,7 @@
           <a:p>
             <a:fld id="{B9C78DC0-302C-4AF6-A3B7-474A49631725}" type="datetimeFigureOut">
               <a:rPr lang="en-GB" smtClean="0"/>
-              <a:t>24/03/2023</a:t>
+              <a:t>17/04/2023</a:t>
             </a:fld>
             <a:endParaRPr lang="en-GB"/>
           </a:p>
@@ -2405,7 +2406,7 @@
           <a:p>
             <a:fld id="{B9C78DC0-302C-4AF6-A3B7-474A49631725}" type="datetimeFigureOut">
               <a:rPr lang="en-GB" smtClean="0"/>
-              <a:t>24/03/2023</a:t>
+              <a:t>17/04/2023</a:t>
             </a:fld>
             <a:endParaRPr lang="en-GB"/>
           </a:p>
@@ -2694,7 +2695,7 @@
           <a:p>
             <a:fld id="{B9C78DC0-302C-4AF6-A3B7-474A49631725}" type="datetimeFigureOut">
               <a:rPr lang="en-GB" smtClean="0"/>
-              <a:t>24/03/2023</a:t>
+              <a:t>17/04/2023</a:t>
             </a:fld>
             <a:endParaRPr lang="en-GB"/>
           </a:p>
@@ -2937,7 +2938,7 @@
           <a:p>
             <a:fld id="{B9C78DC0-302C-4AF6-A3B7-474A49631725}" type="datetimeFigureOut">
               <a:rPr lang="en-GB" smtClean="0"/>
-              <a:t>24/03/2023</a:t>
+              <a:t>17/04/2023</a:t>
             </a:fld>
             <a:endParaRPr lang="en-GB"/>
           </a:p>
@@ -8884,6 +8885,1148 @@
 </p:sld>
 </file>
 
+<file path=ppt/slides/slide9.xml><?xml version="1.0" encoding="utf-8"?>
+<p:sld xmlns:a="http://schemas.openxmlformats.org/drawingml/2006/main" xmlns:r="http://schemas.openxmlformats.org/officeDocument/2006/relationships" xmlns:p="http://schemas.openxmlformats.org/presentationml/2006/main">
+  <p:cSld>
+    <p:spTree>
+      <p:nvGrpSpPr>
+        <p:cNvPr id="1" name=""/>
+        <p:cNvGrpSpPr/>
+        <p:nvPr/>
+      </p:nvGrpSpPr>
+      <p:grpSpPr>
+        <a:xfrm>
+          <a:off x="0" y="0"/>
+          <a:ext cx="0" cy="0"/>
+          <a:chOff x="0" y="0"/>
+          <a:chExt cx="0" cy="0"/>
+        </a:xfrm>
+      </p:grpSpPr>
+      <p:sp>
+        <p:nvSpPr>
+          <p:cNvPr id="4" name="Rectangle 3">
+            <a:extLst>
+              <a:ext uri="{FF2B5EF4-FFF2-40B4-BE49-F238E27FC236}">
+                <a16:creationId xmlns:a16="http://schemas.microsoft.com/office/drawing/2014/main" id="{277CF904-8BBE-617B-838F-C96125FA6C2E}"/>
+              </a:ext>
+            </a:extLst>
+          </p:cNvPr>
+          <p:cNvSpPr/>
+          <p:nvPr/>
+        </p:nvSpPr>
+        <p:spPr>
+          <a:xfrm>
+            <a:off x="5938" y="0"/>
+            <a:ext cx="12192000" cy="6858000"/>
+          </a:xfrm>
+          <a:prstGeom prst="rect">
+            <a:avLst/>
+          </a:prstGeom>
+        </p:spPr>
+        <p:style>
+          <a:lnRef idx="2">
+            <a:schemeClr val="accent2">
+              <a:shade val="50000"/>
+            </a:schemeClr>
+          </a:lnRef>
+          <a:fillRef idx="1">
+            <a:schemeClr val="accent2"/>
+          </a:fillRef>
+          <a:effectRef idx="0">
+            <a:schemeClr val="accent2"/>
+          </a:effectRef>
+          <a:fontRef idx="minor">
+            <a:schemeClr val="lt1"/>
+          </a:fontRef>
+        </p:style>
+        <p:txBody>
+          <a:bodyPr rtlCol="0" anchor="ctr"/>
+          <a:lstStyle/>
+          <a:p>
+            <a:pPr algn="ctr"/>
+            <a:endParaRPr lang="en-GB"/>
+          </a:p>
+        </p:txBody>
+      </p:sp>
+      <p:sp>
+        <p:nvSpPr>
+          <p:cNvPr id="5" name="Rectangle 4">
+            <a:extLst>
+              <a:ext uri="{FF2B5EF4-FFF2-40B4-BE49-F238E27FC236}">
+                <a16:creationId xmlns:a16="http://schemas.microsoft.com/office/drawing/2014/main" id="{C9A174A8-9A94-613F-269D-CE6BEBB54C43}"/>
+              </a:ext>
+            </a:extLst>
+          </p:cNvPr>
+          <p:cNvSpPr/>
+          <p:nvPr/>
+        </p:nvSpPr>
+        <p:spPr>
+          <a:xfrm>
+            <a:off x="3984171" y="391886"/>
+            <a:ext cx="4144489" cy="6068291"/>
+          </a:xfrm>
+          <a:prstGeom prst="rect">
+            <a:avLst/>
+          </a:prstGeom>
+        </p:spPr>
+        <p:style>
+          <a:lnRef idx="2">
+            <a:schemeClr val="dk1"/>
+          </a:lnRef>
+          <a:fillRef idx="1">
+            <a:schemeClr val="lt1"/>
+          </a:fillRef>
+          <a:effectRef idx="0">
+            <a:schemeClr val="dk1"/>
+          </a:effectRef>
+          <a:fontRef idx="minor">
+            <a:schemeClr val="dk1"/>
+          </a:fontRef>
+        </p:style>
+        <p:txBody>
+          <a:bodyPr rtlCol="0" anchor="ctr"/>
+          <a:lstStyle/>
+          <a:p>
+            <a:pPr algn="ctr"/>
+            <a:endParaRPr lang="en-GB"/>
+          </a:p>
+        </p:txBody>
+      </p:sp>
+      <p:sp>
+        <p:nvSpPr>
+          <p:cNvPr id="6" name="Rectangle 5">
+            <a:extLst>
+              <a:ext uri="{FF2B5EF4-FFF2-40B4-BE49-F238E27FC236}">
+                <a16:creationId xmlns:a16="http://schemas.microsoft.com/office/drawing/2014/main" id="{AE2ABB4B-6CE4-9A9A-E26A-FD0DC5B10E48}"/>
+              </a:ext>
+            </a:extLst>
+          </p:cNvPr>
+          <p:cNvSpPr/>
+          <p:nvPr/>
+        </p:nvSpPr>
+        <p:spPr>
+          <a:xfrm>
+            <a:off x="4215740" y="587829"/>
+            <a:ext cx="3752603" cy="587828"/>
+          </a:xfrm>
+          <a:prstGeom prst="rect">
+            <a:avLst/>
+          </a:prstGeom>
+        </p:spPr>
+        <p:style>
+          <a:lnRef idx="2">
+            <a:schemeClr val="accent1">
+              <a:shade val="50000"/>
+            </a:schemeClr>
+          </a:lnRef>
+          <a:fillRef idx="1">
+            <a:schemeClr val="accent1"/>
+          </a:fillRef>
+          <a:effectRef idx="0">
+            <a:schemeClr val="accent1"/>
+          </a:effectRef>
+          <a:fontRef idx="minor">
+            <a:schemeClr val="lt1"/>
+          </a:fontRef>
+        </p:style>
+        <p:txBody>
+          <a:bodyPr rtlCol="0" anchor="ctr"/>
+          <a:lstStyle/>
+          <a:p>
+            <a:pPr algn="ctr"/>
+            <a:r>
+              <a:rPr lang="en-GB" sz="2000" dirty="0"/>
+              <a:t>Goals</a:t>
+            </a:r>
+          </a:p>
+        </p:txBody>
+      </p:sp>
+      <p:sp>
+        <p:nvSpPr>
+          <p:cNvPr id="8" name="Rectangle 7">
+            <a:extLst>
+              <a:ext uri="{FF2B5EF4-FFF2-40B4-BE49-F238E27FC236}">
+                <a16:creationId xmlns:a16="http://schemas.microsoft.com/office/drawing/2014/main" id="{25ABEB85-C9E0-0279-40DA-9CDDFB8D136A}"/>
+              </a:ext>
+            </a:extLst>
+          </p:cNvPr>
+          <p:cNvSpPr/>
+          <p:nvPr/>
+        </p:nvSpPr>
+        <p:spPr>
+          <a:xfrm>
+            <a:off x="4215740" y="587829"/>
+            <a:ext cx="712520" cy="587828"/>
+          </a:xfrm>
+          <a:prstGeom prst="rect">
+            <a:avLst/>
+          </a:prstGeom>
+        </p:spPr>
+        <p:style>
+          <a:lnRef idx="2">
+            <a:schemeClr val="accent6">
+              <a:shade val="50000"/>
+            </a:schemeClr>
+          </a:lnRef>
+          <a:fillRef idx="1">
+            <a:schemeClr val="accent6"/>
+          </a:fillRef>
+          <a:effectRef idx="0">
+            <a:schemeClr val="accent6"/>
+          </a:effectRef>
+          <a:fontRef idx="minor">
+            <a:schemeClr val="lt1"/>
+          </a:fontRef>
+        </p:style>
+        <p:txBody>
+          <a:bodyPr rtlCol="0" anchor="ctr"/>
+          <a:lstStyle/>
+          <a:p>
+            <a:pPr algn="ctr"/>
+            <a:r>
+              <a:rPr lang="en-GB" sz="1200" dirty="0"/>
+              <a:t>Pull out menu</a:t>
+            </a:r>
+          </a:p>
+        </p:txBody>
+      </p:sp>
+      <p:sp>
+        <p:nvSpPr>
+          <p:cNvPr id="9" name="Rectangle 8">
+            <a:extLst>
+              <a:ext uri="{FF2B5EF4-FFF2-40B4-BE49-F238E27FC236}">
+                <a16:creationId xmlns:a16="http://schemas.microsoft.com/office/drawing/2014/main" id="{E634329C-A768-542C-6E9F-CDC2F4C7C5B0}"/>
+              </a:ext>
+            </a:extLst>
+          </p:cNvPr>
+          <p:cNvSpPr/>
+          <p:nvPr/>
+        </p:nvSpPr>
+        <p:spPr>
+          <a:xfrm>
+            <a:off x="4310742" y="1324100"/>
+            <a:ext cx="3562598" cy="243444"/>
+          </a:xfrm>
+          <a:prstGeom prst="rect">
+            <a:avLst/>
+          </a:prstGeom>
+        </p:spPr>
+        <p:style>
+          <a:lnRef idx="2">
+            <a:schemeClr val="accent1">
+              <a:shade val="50000"/>
+            </a:schemeClr>
+          </a:lnRef>
+          <a:fillRef idx="1">
+            <a:schemeClr val="accent1"/>
+          </a:fillRef>
+          <a:effectRef idx="0">
+            <a:schemeClr val="accent1"/>
+          </a:effectRef>
+          <a:fontRef idx="minor">
+            <a:schemeClr val="lt1"/>
+          </a:fontRef>
+        </p:style>
+        <p:txBody>
+          <a:bodyPr rtlCol="0" anchor="ctr"/>
+          <a:lstStyle/>
+          <a:p>
+            <a:pPr algn="ctr"/>
+            <a:r>
+              <a:rPr lang="en-GB" dirty="0"/>
+              <a:t>Exercise</a:t>
+            </a:r>
+          </a:p>
+        </p:txBody>
+      </p:sp>
+      <p:sp>
+        <p:nvSpPr>
+          <p:cNvPr id="2" name="Rectangle 1">
+            <a:extLst>
+              <a:ext uri="{FF2B5EF4-FFF2-40B4-BE49-F238E27FC236}">
+                <a16:creationId xmlns:a16="http://schemas.microsoft.com/office/drawing/2014/main" id="{7544A857-4417-6257-6313-D477DF8E60D3}"/>
+              </a:ext>
+            </a:extLst>
+          </p:cNvPr>
+          <p:cNvSpPr/>
+          <p:nvPr/>
+        </p:nvSpPr>
+        <p:spPr>
+          <a:xfrm>
+            <a:off x="4310742" y="1567543"/>
+            <a:ext cx="3562598" cy="2131621"/>
+          </a:xfrm>
+          <a:prstGeom prst="rect">
+            <a:avLst/>
+          </a:prstGeom>
+        </p:spPr>
+        <p:style>
+          <a:lnRef idx="2">
+            <a:schemeClr val="accent1">
+              <a:shade val="50000"/>
+            </a:schemeClr>
+          </a:lnRef>
+          <a:fillRef idx="1">
+            <a:schemeClr val="accent1"/>
+          </a:fillRef>
+          <a:effectRef idx="0">
+            <a:schemeClr val="accent1"/>
+          </a:effectRef>
+          <a:fontRef idx="minor">
+            <a:schemeClr val="lt1"/>
+          </a:fontRef>
+        </p:style>
+        <p:txBody>
+          <a:bodyPr rtlCol="0" anchor="ctr"/>
+          <a:lstStyle/>
+          <a:p>
+            <a:pPr algn="ctr"/>
+            <a:endParaRPr lang="en-GB"/>
+          </a:p>
+        </p:txBody>
+      </p:sp>
+      <p:sp>
+        <p:nvSpPr>
+          <p:cNvPr id="7" name="Rectangle 6">
+            <a:extLst>
+              <a:ext uri="{FF2B5EF4-FFF2-40B4-BE49-F238E27FC236}">
+                <a16:creationId xmlns:a16="http://schemas.microsoft.com/office/drawing/2014/main" id="{B7D367F2-A2E2-6CC7-B945-B8EF8E4D48B0}"/>
+              </a:ext>
+            </a:extLst>
+          </p:cNvPr>
+          <p:cNvSpPr/>
+          <p:nvPr/>
+        </p:nvSpPr>
+        <p:spPr>
+          <a:xfrm>
+            <a:off x="4310742" y="1567544"/>
+            <a:ext cx="3562598" cy="4613562"/>
+          </a:xfrm>
+          <a:prstGeom prst="rect">
+            <a:avLst/>
+          </a:prstGeom>
+        </p:spPr>
+        <p:style>
+          <a:lnRef idx="2">
+            <a:schemeClr val="accent1">
+              <a:shade val="50000"/>
+            </a:schemeClr>
+          </a:lnRef>
+          <a:fillRef idx="1">
+            <a:schemeClr val="accent1"/>
+          </a:fillRef>
+          <a:effectRef idx="0">
+            <a:schemeClr val="accent1"/>
+          </a:effectRef>
+          <a:fontRef idx="minor">
+            <a:schemeClr val="lt1"/>
+          </a:fontRef>
+        </p:style>
+        <p:txBody>
+          <a:bodyPr rtlCol="0" anchor="ctr"/>
+          <a:lstStyle/>
+          <a:p>
+            <a:pPr algn="ctr"/>
+            <a:endParaRPr lang="en-GB"/>
+          </a:p>
+        </p:txBody>
+      </p:sp>
+      <p:sp>
+        <p:nvSpPr>
+          <p:cNvPr id="10" name="Rectangle 9">
+            <a:extLst>
+              <a:ext uri="{FF2B5EF4-FFF2-40B4-BE49-F238E27FC236}">
+                <a16:creationId xmlns:a16="http://schemas.microsoft.com/office/drawing/2014/main" id="{846C2734-56A0-8057-71CB-3ABD3089BE35}"/>
+              </a:ext>
+            </a:extLst>
+          </p:cNvPr>
+          <p:cNvSpPr/>
+          <p:nvPr/>
+        </p:nvSpPr>
+        <p:spPr>
+          <a:xfrm>
+            <a:off x="4310742" y="1324100"/>
+            <a:ext cx="3562598" cy="243444"/>
+          </a:xfrm>
+          <a:prstGeom prst="rect">
+            <a:avLst/>
+          </a:prstGeom>
+        </p:spPr>
+        <p:style>
+          <a:lnRef idx="2">
+            <a:schemeClr val="accent6">
+              <a:shade val="50000"/>
+            </a:schemeClr>
+          </a:lnRef>
+          <a:fillRef idx="1">
+            <a:schemeClr val="accent6"/>
+          </a:fillRef>
+          <a:effectRef idx="0">
+            <a:schemeClr val="accent6"/>
+          </a:effectRef>
+          <a:fontRef idx="minor">
+            <a:schemeClr val="lt1"/>
+          </a:fontRef>
+        </p:style>
+        <p:txBody>
+          <a:bodyPr rtlCol="0" anchor="ctr"/>
+          <a:lstStyle/>
+          <a:p>
+            <a:pPr algn="ctr"/>
+            <a:r>
+              <a:rPr lang="en-GB" dirty="0"/>
+              <a:t>Add Goal</a:t>
+            </a:r>
+          </a:p>
+        </p:txBody>
+      </p:sp>
+      <p:sp>
+        <p:nvSpPr>
+          <p:cNvPr id="3" name="Rectangle 2">
+            <a:extLst>
+              <a:ext uri="{FF2B5EF4-FFF2-40B4-BE49-F238E27FC236}">
+                <a16:creationId xmlns:a16="http://schemas.microsoft.com/office/drawing/2014/main" id="{6B4797E0-E5DA-7C1E-E457-F2F06FD80B89}"/>
+              </a:ext>
+            </a:extLst>
+          </p:cNvPr>
+          <p:cNvSpPr/>
+          <p:nvPr/>
+        </p:nvSpPr>
+        <p:spPr>
+          <a:xfrm>
+            <a:off x="4310742" y="1567542"/>
+            <a:ext cx="3562598" cy="391888"/>
+          </a:xfrm>
+          <a:prstGeom prst="rect">
+            <a:avLst/>
+          </a:prstGeom>
+        </p:spPr>
+        <p:style>
+          <a:lnRef idx="2">
+            <a:schemeClr val="accent1">
+              <a:shade val="50000"/>
+            </a:schemeClr>
+          </a:lnRef>
+          <a:fillRef idx="1">
+            <a:schemeClr val="accent1"/>
+          </a:fillRef>
+          <a:effectRef idx="0">
+            <a:schemeClr val="accent1"/>
+          </a:effectRef>
+          <a:fontRef idx="minor">
+            <a:schemeClr val="lt1"/>
+          </a:fontRef>
+        </p:style>
+        <p:txBody>
+          <a:bodyPr rtlCol="0" anchor="ctr"/>
+          <a:lstStyle/>
+          <a:p>
+            <a:pPr algn="ctr"/>
+            <a:endParaRPr lang="en-GB"/>
+          </a:p>
+        </p:txBody>
+      </p:sp>
+      <p:cxnSp>
+        <p:nvCxnSpPr>
+          <p:cNvPr id="18" name="Straight Connector 17">
+            <a:extLst>
+              <a:ext uri="{FF2B5EF4-FFF2-40B4-BE49-F238E27FC236}">
+                <a16:creationId xmlns:a16="http://schemas.microsoft.com/office/drawing/2014/main" id="{E99B848D-E542-C511-815D-A60912A4ABB8}"/>
+              </a:ext>
+            </a:extLst>
+          </p:cNvPr>
+          <p:cNvCxnSpPr/>
+          <p:nvPr/>
+        </p:nvCxnSpPr>
+        <p:spPr>
+          <a:xfrm flipV="1">
+            <a:off x="4940135" y="1567542"/>
+            <a:ext cx="0" cy="391888"/>
+          </a:xfrm>
+          <a:prstGeom prst="line">
+            <a:avLst/>
+          </a:prstGeom>
+        </p:spPr>
+        <p:style>
+          <a:lnRef idx="2">
+            <a:schemeClr val="dk1"/>
+          </a:lnRef>
+          <a:fillRef idx="0">
+            <a:schemeClr val="dk1"/>
+          </a:fillRef>
+          <a:effectRef idx="1">
+            <a:schemeClr val="dk1"/>
+          </a:effectRef>
+          <a:fontRef idx="minor">
+            <a:schemeClr val="tx1"/>
+          </a:fontRef>
+        </p:style>
+      </p:cxnSp>
+      <p:cxnSp>
+        <p:nvCxnSpPr>
+          <p:cNvPr id="19" name="Straight Connector 18">
+            <a:extLst>
+              <a:ext uri="{FF2B5EF4-FFF2-40B4-BE49-F238E27FC236}">
+                <a16:creationId xmlns:a16="http://schemas.microsoft.com/office/drawing/2014/main" id="{26FBA6FF-4ADA-F515-6653-99E4DBD234F8}"/>
+              </a:ext>
+            </a:extLst>
+          </p:cNvPr>
+          <p:cNvCxnSpPr/>
+          <p:nvPr/>
+        </p:nvCxnSpPr>
+        <p:spPr>
+          <a:xfrm flipV="1">
+            <a:off x="7176654" y="1567542"/>
+            <a:ext cx="0" cy="391888"/>
+          </a:xfrm>
+          <a:prstGeom prst="line">
+            <a:avLst/>
+          </a:prstGeom>
+        </p:spPr>
+        <p:style>
+          <a:lnRef idx="2">
+            <a:schemeClr val="dk1"/>
+          </a:lnRef>
+          <a:fillRef idx="0">
+            <a:schemeClr val="dk1"/>
+          </a:fillRef>
+          <a:effectRef idx="1">
+            <a:schemeClr val="dk1"/>
+          </a:effectRef>
+          <a:fontRef idx="minor">
+            <a:schemeClr val="tx1"/>
+          </a:fontRef>
+        </p:style>
+      </p:cxnSp>
+      <p:sp>
+        <p:nvSpPr>
+          <p:cNvPr id="20" name="Rectangle 19">
+            <a:extLst>
+              <a:ext uri="{FF2B5EF4-FFF2-40B4-BE49-F238E27FC236}">
+                <a16:creationId xmlns:a16="http://schemas.microsoft.com/office/drawing/2014/main" id="{D9A90F3C-3621-27F0-45F4-249769C48B70}"/>
+              </a:ext>
+            </a:extLst>
+          </p:cNvPr>
+          <p:cNvSpPr/>
+          <p:nvPr/>
+        </p:nvSpPr>
+        <p:spPr>
+          <a:xfrm>
+            <a:off x="7184571" y="1567541"/>
+            <a:ext cx="688764" cy="391889"/>
+          </a:xfrm>
+          <a:prstGeom prst="rect">
+            <a:avLst/>
+          </a:prstGeom>
+        </p:spPr>
+        <p:style>
+          <a:lnRef idx="2">
+            <a:schemeClr val="accent2">
+              <a:shade val="50000"/>
+            </a:schemeClr>
+          </a:lnRef>
+          <a:fillRef idx="1">
+            <a:schemeClr val="accent2"/>
+          </a:fillRef>
+          <a:effectRef idx="0">
+            <a:schemeClr val="accent2"/>
+          </a:effectRef>
+          <a:fontRef idx="minor">
+            <a:schemeClr val="lt1"/>
+          </a:fontRef>
+        </p:style>
+        <p:txBody>
+          <a:bodyPr rtlCol="0" anchor="ctr"/>
+          <a:lstStyle/>
+          <a:p>
+            <a:pPr algn="ctr"/>
+            <a:r>
+              <a:rPr lang="en-GB" dirty="0">
+                <a:solidFill>
+                  <a:schemeClr val="tx1"/>
+                </a:solidFill>
+              </a:rPr>
+              <a:t>X</a:t>
+            </a:r>
+          </a:p>
+        </p:txBody>
+      </p:sp>
+      <p:sp>
+        <p:nvSpPr>
+          <p:cNvPr id="21" name="Rectangle 20">
+            <a:extLst>
+              <a:ext uri="{FF2B5EF4-FFF2-40B4-BE49-F238E27FC236}">
+                <a16:creationId xmlns:a16="http://schemas.microsoft.com/office/drawing/2014/main" id="{34D022C8-B6E1-0049-6213-976BCAFC4B93}"/>
+              </a:ext>
+            </a:extLst>
+          </p:cNvPr>
+          <p:cNvSpPr/>
+          <p:nvPr/>
+        </p:nvSpPr>
+        <p:spPr>
+          <a:xfrm>
+            <a:off x="4310742" y="1567541"/>
+            <a:ext cx="617518" cy="391889"/>
+          </a:xfrm>
+          <a:prstGeom prst="rect">
+            <a:avLst/>
+          </a:prstGeom>
+        </p:spPr>
+        <p:style>
+          <a:lnRef idx="2">
+            <a:schemeClr val="accent1">
+              <a:shade val="50000"/>
+            </a:schemeClr>
+          </a:lnRef>
+          <a:fillRef idx="1">
+            <a:schemeClr val="accent1"/>
+          </a:fillRef>
+          <a:effectRef idx="0">
+            <a:schemeClr val="accent1"/>
+          </a:effectRef>
+          <a:fontRef idx="minor">
+            <a:schemeClr val="lt1"/>
+          </a:fontRef>
+        </p:style>
+        <p:txBody>
+          <a:bodyPr rtlCol="0" anchor="ctr"/>
+          <a:lstStyle/>
+          <a:p>
+            <a:pPr algn="ctr"/>
+            <a:r>
+              <a:rPr lang="en-GB" sz="1200" dirty="0"/>
+              <a:t>Due Date</a:t>
+            </a:r>
+          </a:p>
+        </p:txBody>
+      </p:sp>
+      <p:sp>
+        <p:nvSpPr>
+          <p:cNvPr id="22" name="Rectangle 21">
+            <a:extLst>
+              <a:ext uri="{FF2B5EF4-FFF2-40B4-BE49-F238E27FC236}">
+                <a16:creationId xmlns:a16="http://schemas.microsoft.com/office/drawing/2014/main" id="{76A8EF79-3F87-D2D9-2E05-DAD8C51CE275}"/>
+              </a:ext>
+            </a:extLst>
+          </p:cNvPr>
+          <p:cNvSpPr/>
+          <p:nvPr/>
+        </p:nvSpPr>
+        <p:spPr>
+          <a:xfrm>
+            <a:off x="4928260" y="1567541"/>
+            <a:ext cx="2256306" cy="391888"/>
+          </a:xfrm>
+          <a:prstGeom prst="rect">
+            <a:avLst/>
+          </a:prstGeom>
+        </p:spPr>
+        <p:style>
+          <a:lnRef idx="2">
+            <a:schemeClr val="accent1">
+              <a:shade val="50000"/>
+            </a:schemeClr>
+          </a:lnRef>
+          <a:fillRef idx="1">
+            <a:schemeClr val="accent1"/>
+          </a:fillRef>
+          <a:effectRef idx="0">
+            <a:schemeClr val="accent1"/>
+          </a:effectRef>
+          <a:fontRef idx="minor">
+            <a:schemeClr val="lt1"/>
+          </a:fontRef>
+        </p:style>
+        <p:txBody>
+          <a:bodyPr rtlCol="0" anchor="ctr"/>
+          <a:lstStyle/>
+          <a:p>
+            <a:pPr algn="ctr"/>
+            <a:r>
+              <a:rPr lang="en-GB" dirty="0"/>
+              <a:t>Goal info</a:t>
+            </a:r>
+          </a:p>
+        </p:txBody>
+      </p:sp>
+      <p:sp>
+        <p:nvSpPr>
+          <p:cNvPr id="23" name="Rectangle 22">
+            <a:extLst>
+              <a:ext uri="{FF2B5EF4-FFF2-40B4-BE49-F238E27FC236}">
+                <a16:creationId xmlns:a16="http://schemas.microsoft.com/office/drawing/2014/main" id="{7B1879F3-6B3F-E418-7D47-291DEC84F26D}"/>
+              </a:ext>
+            </a:extLst>
+          </p:cNvPr>
+          <p:cNvSpPr/>
+          <p:nvPr/>
+        </p:nvSpPr>
+        <p:spPr>
+          <a:xfrm>
+            <a:off x="7182589" y="1957444"/>
+            <a:ext cx="688764" cy="391889"/>
+          </a:xfrm>
+          <a:prstGeom prst="rect">
+            <a:avLst/>
+          </a:prstGeom>
+        </p:spPr>
+        <p:style>
+          <a:lnRef idx="2">
+            <a:schemeClr val="accent2">
+              <a:shade val="50000"/>
+            </a:schemeClr>
+          </a:lnRef>
+          <a:fillRef idx="1">
+            <a:schemeClr val="accent2"/>
+          </a:fillRef>
+          <a:effectRef idx="0">
+            <a:schemeClr val="accent2"/>
+          </a:effectRef>
+          <a:fontRef idx="minor">
+            <a:schemeClr val="lt1"/>
+          </a:fontRef>
+        </p:style>
+        <p:txBody>
+          <a:bodyPr rtlCol="0" anchor="ctr"/>
+          <a:lstStyle/>
+          <a:p>
+            <a:pPr algn="ctr"/>
+            <a:r>
+              <a:rPr lang="en-GB" dirty="0">
+                <a:solidFill>
+                  <a:schemeClr val="tx1"/>
+                </a:solidFill>
+              </a:rPr>
+              <a:t>X</a:t>
+            </a:r>
+          </a:p>
+        </p:txBody>
+      </p:sp>
+      <p:sp>
+        <p:nvSpPr>
+          <p:cNvPr id="24" name="Rectangle 23">
+            <a:extLst>
+              <a:ext uri="{FF2B5EF4-FFF2-40B4-BE49-F238E27FC236}">
+                <a16:creationId xmlns:a16="http://schemas.microsoft.com/office/drawing/2014/main" id="{DD4203D1-9F0B-9E84-5A9F-0C7E8ABF2DE5}"/>
+              </a:ext>
+            </a:extLst>
+          </p:cNvPr>
+          <p:cNvSpPr/>
+          <p:nvPr/>
+        </p:nvSpPr>
+        <p:spPr>
+          <a:xfrm>
+            <a:off x="4308760" y="1957444"/>
+            <a:ext cx="617518" cy="391889"/>
+          </a:xfrm>
+          <a:prstGeom prst="rect">
+            <a:avLst/>
+          </a:prstGeom>
+        </p:spPr>
+        <p:style>
+          <a:lnRef idx="2">
+            <a:schemeClr val="accent5">
+              <a:shade val="50000"/>
+            </a:schemeClr>
+          </a:lnRef>
+          <a:fillRef idx="1">
+            <a:schemeClr val="accent5"/>
+          </a:fillRef>
+          <a:effectRef idx="0">
+            <a:schemeClr val="accent5"/>
+          </a:effectRef>
+          <a:fontRef idx="minor">
+            <a:schemeClr val="lt1"/>
+          </a:fontRef>
+        </p:style>
+        <p:txBody>
+          <a:bodyPr rtlCol="0" anchor="ctr"/>
+          <a:lstStyle/>
+          <a:p>
+            <a:pPr algn="ctr"/>
+            <a:r>
+              <a:rPr lang="en-GB" sz="1200" dirty="0"/>
+              <a:t>Due Date</a:t>
+            </a:r>
+          </a:p>
+        </p:txBody>
+      </p:sp>
+      <p:sp>
+        <p:nvSpPr>
+          <p:cNvPr id="25" name="Rectangle 24">
+            <a:extLst>
+              <a:ext uri="{FF2B5EF4-FFF2-40B4-BE49-F238E27FC236}">
+                <a16:creationId xmlns:a16="http://schemas.microsoft.com/office/drawing/2014/main" id="{C59CE917-D12D-F7D4-E6CF-AD08AF87DDA0}"/>
+              </a:ext>
+            </a:extLst>
+          </p:cNvPr>
+          <p:cNvSpPr/>
+          <p:nvPr/>
+        </p:nvSpPr>
+        <p:spPr>
+          <a:xfrm>
+            <a:off x="4926278" y="1957444"/>
+            <a:ext cx="2256306" cy="391888"/>
+          </a:xfrm>
+          <a:prstGeom prst="rect">
+            <a:avLst/>
+          </a:prstGeom>
+        </p:spPr>
+        <p:style>
+          <a:lnRef idx="2">
+            <a:schemeClr val="accent5">
+              <a:shade val="50000"/>
+            </a:schemeClr>
+          </a:lnRef>
+          <a:fillRef idx="1">
+            <a:schemeClr val="accent5"/>
+          </a:fillRef>
+          <a:effectRef idx="0">
+            <a:schemeClr val="accent5"/>
+          </a:effectRef>
+          <a:fontRef idx="minor">
+            <a:schemeClr val="lt1"/>
+          </a:fontRef>
+        </p:style>
+        <p:txBody>
+          <a:bodyPr rtlCol="0" anchor="ctr"/>
+          <a:lstStyle/>
+          <a:p>
+            <a:pPr algn="ctr"/>
+            <a:r>
+              <a:rPr lang="en-GB" dirty="0"/>
+              <a:t>Goal info</a:t>
+            </a:r>
+          </a:p>
+        </p:txBody>
+      </p:sp>
+      <p:sp>
+        <p:nvSpPr>
+          <p:cNvPr id="33" name="Rectangle 32">
+            <a:extLst>
+              <a:ext uri="{FF2B5EF4-FFF2-40B4-BE49-F238E27FC236}">
+                <a16:creationId xmlns:a16="http://schemas.microsoft.com/office/drawing/2014/main" id="{E8F65D9E-B483-436F-64C4-7B39E20CAF0D}"/>
+              </a:ext>
+            </a:extLst>
+          </p:cNvPr>
+          <p:cNvSpPr/>
+          <p:nvPr/>
+        </p:nvSpPr>
+        <p:spPr>
+          <a:xfrm>
+            <a:off x="7182586" y="2349330"/>
+            <a:ext cx="688764" cy="391889"/>
+          </a:xfrm>
+          <a:prstGeom prst="rect">
+            <a:avLst/>
+          </a:prstGeom>
+        </p:spPr>
+        <p:style>
+          <a:lnRef idx="2">
+            <a:schemeClr val="accent2">
+              <a:shade val="50000"/>
+            </a:schemeClr>
+          </a:lnRef>
+          <a:fillRef idx="1">
+            <a:schemeClr val="accent2"/>
+          </a:fillRef>
+          <a:effectRef idx="0">
+            <a:schemeClr val="accent2"/>
+          </a:effectRef>
+          <a:fontRef idx="minor">
+            <a:schemeClr val="lt1"/>
+          </a:fontRef>
+        </p:style>
+        <p:txBody>
+          <a:bodyPr rtlCol="0" anchor="ctr"/>
+          <a:lstStyle/>
+          <a:p>
+            <a:pPr algn="ctr"/>
+            <a:r>
+              <a:rPr lang="en-GB" dirty="0">
+                <a:solidFill>
+                  <a:schemeClr val="tx1"/>
+                </a:solidFill>
+              </a:rPr>
+              <a:t>X</a:t>
+            </a:r>
+          </a:p>
+        </p:txBody>
+      </p:sp>
+      <p:sp>
+        <p:nvSpPr>
+          <p:cNvPr id="34" name="Rectangle 33">
+            <a:extLst>
+              <a:ext uri="{FF2B5EF4-FFF2-40B4-BE49-F238E27FC236}">
+                <a16:creationId xmlns:a16="http://schemas.microsoft.com/office/drawing/2014/main" id="{17EF8FC8-5A5D-32B4-5AC3-BF72E613C5F2}"/>
+              </a:ext>
+            </a:extLst>
+          </p:cNvPr>
+          <p:cNvSpPr/>
+          <p:nvPr/>
+        </p:nvSpPr>
+        <p:spPr>
+          <a:xfrm>
+            <a:off x="4308757" y="2349330"/>
+            <a:ext cx="617518" cy="391889"/>
+          </a:xfrm>
+          <a:prstGeom prst="rect">
+            <a:avLst/>
+          </a:prstGeom>
+          <a:solidFill>
+            <a:srgbClr val="C44444"/>
+          </a:solidFill>
+        </p:spPr>
+        <p:style>
+          <a:lnRef idx="2">
+            <a:schemeClr val="accent1">
+              <a:shade val="50000"/>
+            </a:schemeClr>
+          </a:lnRef>
+          <a:fillRef idx="1">
+            <a:schemeClr val="accent1"/>
+          </a:fillRef>
+          <a:effectRef idx="0">
+            <a:schemeClr val="accent1"/>
+          </a:effectRef>
+          <a:fontRef idx="minor">
+            <a:schemeClr val="lt1"/>
+          </a:fontRef>
+        </p:style>
+        <p:txBody>
+          <a:bodyPr rtlCol="0" anchor="ctr"/>
+          <a:lstStyle/>
+          <a:p>
+            <a:pPr algn="ctr"/>
+            <a:r>
+              <a:rPr lang="en-GB" sz="900" dirty="0"/>
+              <a:t>Past Due Date</a:t>
+            </a:r>
+          </a:p>
+        </p:txBody>
+      </p:sp>
+      <p:sp>
+        <p:nvSpPr>
+          <p:cNvPr id="35" name="Rectangle 34">
+            <a:extLst>
+              <a:ext uri="{FF2B5EF4-FFF2-40B4-BE49-F238E27FC236}">
+                <a16:creationId xmlns:a16="http://schemas.microsoft.com/office/drawing/2014/main" id="{DA774BCA-A40A-8031-F6C1-EAC0C113AA21}"/>
+              </a:ext>
+            </a:extLst>
+          </p:cNvPr>
+          <p:cNvSpPr/>
+          <p:nvPr/>
+        </p:nvSpPr>
+        <p:spPr>
+          <a:xfrm>
+            <a:off x="4926275" y="2349330"/>
+            <a:ext cx="2256306" cy="391888"/>
+          </a:xfrm>
+          <a:prstGeom prst="rect">
+            <a:avLst/>
+          </a:prstGeom>
+          <a:solidFill>
+            <a:srgbClr val="C44444"/>
+          </a:solidFill>
+        </p:spPr>
+        <p:style>
+          <a:lnRef idx="2">
+            <a:schemeClr val="accent1">
+              <a:shade val="50000"/>
+            </a:schemeClr>
+          </a:lnRef>
+          <a:fillRef idx="1">
+            <a:schemeClr val="accent1"/>
+          </a:fillRef>
+          <a:effectRef idx="0">
+            <a:schemeClr val="accent1"/>
+          </a:effectRef>
+          <a:fontRef idx="minor">
+            <a:schemeClr val="lt1"/>
+          </a:fontRef>
+        </p:style>
+        <p:txBody>
+          <a:bodyPr rtlCol="0" anchor="ctr"/>
+          <a:lstStyle/>
+          <a:p>
+            <a:pPr algn="ctr"/>
+            <a:r>
+              <a:rPr lang="en-GB" dirty="0"/>
+              <a:t>Goal info</a:t>
+            </a:r>
+          </a:p>
+        </p:txBody>
+      </p:sp>
+      <p:sp>
+        <p:nvSpPr>
+          <p:cNvPr id="36" name="Rectangle 35">
+            <a:extLst>
+              <a:ext uri="{FF2B5EF4-FFF2-40B4-BE49-F238E27FC236}">
+                <a16:creationId xmlns:a16="http://schemas.microsoft.com/office/drawing/2014/main" id="{203AD945-34C6-822B-8C16-5CDADB03CB34}"/>
+              </a:ext>
+            </a:extLst>
+          </p:cNvPr>
+          <p:cNvSpPr/>
+          <p:nvPr/>
+        </p:nvSpPr>
+        <p:spPr>
+          <a:xfrm>
+            <a:off x="7186542" y="2739233"/>
+            <a:ext cx="688764" cy="391889"/>
+          </a:xfrm>
+          <a:prstGeom prst="rect">
+            <a:avLst/>
+          </a:prstGeom>
+        </p:spPr>
+        <p:style>
+          <a:lnRef idx="2">
+            <a:schemeClr val="accent2">
+              <a:shade val="50000"/>
+            </a:schemeClr>
+          </a:lnRef>
+          <a:fillRef idx="1">
+            <a:schemeClr val="accent2"/>
+          </a:fillRef>
+          <a:effectRef idx="0">
+            <a:schemeClr val="accent2"/>
+          </a:effectRef>
+          <a:fontRef idx="minor">
+            <a:schemeClr val="lt1"/>
+          </a:fontRef>
+        </p:style>
+        <p:txBody>
+          <a:bodyPr rtlCol="0" anchor="ctr"/>
+          <a:lstStyle/>
+          <a:p>
+            <a:pPr algn="ctr"/>
+            <a:r>
+              <a:rPr lang="en-GB" dirty="0">
+                <a:solidFill>
+                  <a:schemeClr val="tx1"/>
+                </a:solidFill>
+              </a:rPr>
+              <a:t>X</a:t>
+            </a:r>
+          </a:p>
+        </p:txBody>
+      </p:sp>
+      <p:sp>
+        <p:nvSpPr>
+          <p:cNvPr id="37" name="Rectangle 36">
+            <a:extLst>
+              <a:ext uri="{FF2B5EF4-FFF2-40B4-BE49-F238E27FC236}">
+                <a16:creationId xmlns:a16="http://schemas.microsoft.com/office/drawing/2014/main" id="{AD84AD11-F6D7-AAFC-DC54-15F22510398D}"/>
+              </a:ext>
+            </a:extLst>
+          </p:cNvPr>
+          <p:cNvSpPr/>
+          <p:nvPr/>
+        </p:nvSpPr>
+        <p:spPr>
+          <a:xfrm>
+            <a:off x="4312713" y="2739233"/>
+            <a:ext cx="617518" cy="391889"/>
+          </a:xfrm>
+          <a:prstGeom prst="rect">
+            <a:avLst/>
+          </a:prstGeom>
+          <a:solidFill>
+            <a:srgbClr val="E64A4A"/>
+          </a:solidFill>
+        </p:spPr>
+        <p:style>
+          <a:lnRef idx="2">
+            <a:schemeClr val="accent5">
+              <a:shade val="50000"/>
+            </a:schemeClr>
+          </a:lnRef>
+          <a:fillRef idx="1">
+            <a:schemeClr val="accent5"/>
+          </a:fillRef>
+          <a:effectRef idx="0">
+            <a:schemeClr val="accent5"/>
+          </a:effectRef>
+          <a:fontRef idx="minor">
+            <a:schemeClr val="lt1"/>
+          </a:fontRef>
+        </p:style>
+        <p:txBody>
+          <a:bodyPr rtlCol="0" anchor="ctr"/>
+          <a:lstStyle/>
+          <a:p>
+            <a:pPr algn="ctr"/>
+            <a:r>
+              <a:rPr lang="en-GB" sz="900" dirty="0"/>
+              <a:t>Past Due Date</a:t>
+            </a:r>
+          </a:p>
+        </p:txBody>
+      </p:sp>
+      <p:sp>
+        <p:nvSpPr>
+          <p:cNvPr id="38" name="Rectangle 37">
+            <a:extLst>
+              <a:ext uri="{FF2B5EF4-FFF2-40B4-BE49-F238E27FC236}">
+                <a16:creationId xmlns:a16="http://schemas.microsoft.com/office/drawing/2014/main" id="{E54916E2-6D8C-16AA-47C0-0CEBB8F98F02}"/>
+              </a:ext>
+            </a:extLst>
+          </p:cNvPr>
+          <p:cNvSpPr/>
+          <p:nvPr/>
+        </p:nvSpPr>
+        <p:spPr>
+          <a:xfrm>
+            <a:off x="4930231" y="2739233"/>
+            <a:ext cx="2256306" cy="391888"/>
+          </a:xfrm>
+          <a:prstGeom prst="rect">
+            <a:avLst/>
+          </a:prstGeom>
+          <a:solidFill>
+            <a:srgbClr val="E64A4A"/>
+          </a:solidFill>
+        </p:spPr>
+        <p:style>
+          <a:lnRef idx="2">
+            <a:schemeClr val="accent5">
+              <a:shade val="50000"/>
+            </a:schemeClr>
+          </a:lnRef>
+          <a:fillRef idx="1">
+            <a:schemeClr val="accent5"/>
+          </a:fillRef>
+          <a:effectRef idx="0">
+            <a:schemeClr val="accent5"/>
+          </a:effectRef>
+          <a:fontRef idx="minor">
+            <a:schemeClr val="lt1"/>
+          </a:fontRef>
+        </p:style>
+        <p:txBody>
+          <a:bodyPr rtlCol="0" anchor="ctr"/>
+          <a:lstStyle/>
+          <a:p>
+            <a:pPr algn="ctr"/>
+            <a:r>
+              <a:rPr lang="en-GB" dirty="0"/>
+              <a:t>Goal info</a:t>
+            </a:r>
+          </a:p>
+        </p:txBody>
+      </p:sp>
+    </p:spTree>
+    <p:extLst>
+      <p:ext uri="{BB962C8B-B14F-4D97-AF65-F5344CB8AC3E}">
+        <p14:creationId xmlns:p14="http://schemas.microsoft.com/office/powerpoint/2010/main" val="2872469118"/>
+      </p:ext>
+    </p:extLst>
+  </p:cSld>
+  <p:clrMapOvr>
+    <a:masterClrMapping/>
+  </p:clrMapOvr>
+</p:sld>
+</file>
+
 <file path=ppt/theme/theme1.xml><?xml version="1.0" encoding="utf-8"?>
 <a:theme xmlns:a="http://schemas.openxmlformats.org/drawingml/2006/main" name="Office Theme">
   <a:themeElements>

</xml_diff>